<commit_message>
Week 13 presentation update
</commit_message>
<xml_diff>
--- a/Week_13/Final_report.pptx
+++ b/Week_13/Final_report.pptx
@@ -1676,7 +1676,7 @@
   <pc:docChgLst>
     <pc:chgData name="Roger Burek-Bors" userId="52318fc02a824a34" providerId="LiveId" clId="{4CBF7E42-5824-4E57-8FFB-C31B2402BDE5}"/>
     <pc:docChg chg="undo custSel addSld delSld modSld">
-      <pc:chgData name="Roger Burek-Bors" userId="52318fc02a824a34" providerId="LiveId" clId="{4CBF7E42-5824-4E57-8FFB-C31B2402BDE5}" dt="2021-05-10T20:43:10.782" v="2128" actId="790"/>
+      <pc:chgData name="Roger Burek-Bors" userId="52318fc02a824a34" providerId="LiveId" clId="{4CBF7E42-5824-4E57-8FFB-C31B2402BDE5}" dt="2021-05-10T21:23:12.017" v="2132" actId="1076"/>
       <pc:docMkLst>
         <pc:docMk/>
       </pc:docMkLst>
@@ -2039,7 +2039,7 @@
         </pc:graphicFrameChg>
       </pc:sldChg>
       <pc:sldChg chg="addSp delSp modSp add mod">
-        <pc:chgData name="Roger Burek-Bors" userId="52318fc02a824a34" providerId="LiveId" clId="{4CBF7E42-5824-4E57-8FFB-C31B2402BDE5}" dt="2021-05-10T20:33:13.259" v="1886" actId="20577"/>
+        <pc:chgData name="Roger Burek-Bors" userId="52318fc02a824a34" providerId="LiveId" clId="{4CBF7E42-5824-4E57-8FFB-C31B2402BDE5}" dt="2021-05-10T21:23:12.017" v="2132" actId="1076"/>
         <pc:sldMkLst>
           <pc:docMk/>
           <pc:sldMk cId="2111952951" sldId="306"/>
@@ -2133,7 +2133,7 @@
           </ac:spMkLst>
         </pc:spChg>
         <pc:picChg chg="add mod">
-          <ac:chgData name="Roger Burek-Bors" userId="52318fc02a824a34" providerId="LiveId" clId="{4CBF7E42-5824-4E57-8FFB-C31B2402BDE5}" dt="2021-05-10T20:33:05.693" v="1882" actId="1076"/>
+          <ac:chgData name="Roger Burek-Bors" userId="52318fc02a824a34" providerId="LiveId" clId="{4CBF7E42-5824-4E57-8FFB-C31B2402BDE5}" dt="2021-05-10T21:23:12.017" v="2132" actId="1076"/>
           <ac:picMkLst>
             <pc:docMk/>
             <pc:sldMk cId="2111952951" sldId="306"/>
@@ -6812,15 +6812,20 @@
           <p:nvPr/>
         </p:nvPicPr>
         <p:blipFill>
-          <a:blip r:embed="rId2"/>
-          <a:stretch>
-            <a:fillRect/>
-          </a:stretch>
+          <a:blip r:embed="rId2">
+            <a:extLst>
+              <a:ext uri="{28A0092B-C50C-407E-A947-70E740481C1C}">
+                <a14:useLocalDpi xmlns:a14="http://schemas.microsoft.com/office/drawing/2010/main" val="0"/>
+              </a:ext>
+            </a:extLst>
+          </a:blip>
+          <a:srcRect/>
+          <a:stretch/>
         </p:blipFill>
         <p:spPr>
           <a:xfrm>
-            <a:off x="1223356" y="1920176"/>
-            <a:ext cx="3945098" cy="4345497"/>
+            <a:off x="196221" y="1838966"/>
+            <a:ext cx="6281198" cy="4067560"/>
           </a:xfrm>
           <a:prstGeom prst="rect">
             <a:avLst/>

</xml_diff>

<commit_message>
Final report update by Roger
</commit_message>
<xml_diff>
--- a/Week_13/Final_report.pptx
+++ b/Week_13/Final_report.pptx
@@ -1676,18 +1676,18 @@
   <pc:docChgLst>
     <pc:chgData name="Roger Burek-Bors" userId="52318fc02a824a34" providerId="LiveId" clId="{4CBF7E42-5824-4E57-8FFB-C31B2402BDE5}"/>
     <pc:docChg chg="undo custSel addSld delSld modSld">
-      <pc:chgData name="Roger Burek-Bors" userId="52318fc02a824a34" providerId="LiveId" clId="{4CBF7E42-5824-4E57-8FFB-C31B2402BDE5}" dt="2021-05-10T21:23:12.017" v="2132" actId="1076"/>
+      <pc:chgData name="Roger Burek-Bors" userId="52318fc02a824a34" providerId="LiveId" clId="{4CBF7E42-5824-4E57-8FFB-C31B2402BDE5}" dt="2021-05-13T05:19:32.102" v="2140" actId="20577"/>
       <pc:docMkLst>
         <pc:docMk/>
       </pc:docMkLst>
       <pc:sldChg chg="delSp modSp mod">
-        <pc:chgData name="Roger Burek-Bors" userId="52318fc02a824a34" providerId="LiveId" clId="{4CBF7E42-5824-4E57-8FFB-C31B2402BDE5}" dt="2021-05-10T15:18:38.949" v="457" actId="478"/>
+        <pc:chgData name="Roger Burek-Bors" userId="52318fc02a824a34" providerId="LiveId" clId="{4CBF7E42-5824-4E57-8FFB-C31B2402BDE5}" dt="2021-05-13T05:17:55.557" v="2134" actId="20577"/>
         <pc:sldMkLst>
           <pc:docMk/>
           <pc:sldMk cId="109857222" sldId="256"/>
         </pc:sldMkLst>
         <pc:spChg chg="mod">
-          <ac:chgData name="Roger Burek-Bors" userId="52318fc02a824a34" providerId="LiveId" clId="{4CBF7E42-5824-4E57-8FFB-C31B2402BDE5}" dt="2021-05-10T14:54:11.427" v="21" actId="20577"/>
+          <ac:chgData name="Roger Burek-Bors" userId="52318fc02a824a34" providerId="LiveId" clId="{4CBF7E42-5824-4E57-8FFB-C31B2402BDE5}" dt="2021-05-13T05:17:55.557" v="2134" actId="20577"/>
           <ac:spMkLst>
             <pc:docMk/>
             <pc:sldMk cId="109857222" sldId="256"/>
@@ -2039,7 +2039,7 @@
         </pc:graphicFrameChg>
       </pc:sldChg>
       <pc:sldChg chg="addSp delSp modSp add mod">
-        <pc:chgData name="Roger Burek-Bors" userId="52318fc02a824a34" providerId="LiveId" clId="{4CBF7E42-5824-4E57-8FFB-C31B2402BDE5}" dt="2021-05-10T21:23:12.017" v="2132" actId="1076"/>
+        <pc:chgData name="Roger Burek-Bors" userId="52318fc02a824a34" providerId="LiveId" clId="{4CBF7E42-5824-4E57-8FFB-C31B2402BDE5}" dt="2021-05-13T05:18:11.942" v="2136" actId="13926"/>
         <pc:sldMkLst>
           <pc:docMk/>
           <pc:sldMk cId="2111952951" sldId="306"/>
@@ -2077,7 +2077,7 @@
           </ac:spMkLst>
         </pc:spChg>
         <pc:spChg chg="add mod">
-          <ac:chgData name="Roger Burek-Bors" userId="52318fc02a824a34" providerId="LiveId" clId="{4CBF7E42-5824-4E57-8FFB-C31B2402BDE5}" dt="2021-05-10T20:27:31.038" v="1617" actId="13926"/>
+          <ac:chgData name="Roger Burek-Bors" userId="52318fc02a824a34" providerId="LiveId" clId="{4CBF7E42-5824-4E57-8FFB-C31B2402BDE5}" dt="2021-05-13T05:18:11.942" v="2136" actId="13926"/>
           <ac:spMkLst>
             <pc:docMk/>
             <pc:sldMk cId="2111952951" sldId="306"/>
@@ -2142,13 +2142,13 @@
         </pc:picChg>
       </pc:sldChg>
       <pc:sldChg chg="modSp add mod">
-        <pc:chgData name="Roger Burek-Bors" userId="52318fc02a824a34" providerId="LiveId" clId="{4CBF7E42-5824-4E57-8FFB-C31B2402BDE5}" dt="2021-05-10T20:43:10.782" v="2128" actId="790"/>
+        <pc:chgData name="Roger Burek-Bors" userId="52318fc02a824a34" providerId="LiveId" clId="{4CBF7E42-5824-4E57-8FFB-C31B2402BDE5}" dt="2021-05-13T05:19:32.102" v="2140" actId="20577"/>
         <pc:sldMkLst>
           <pc:docMk/>
           <pc:sldMk cId="3314806396" sldId="307"/>
         </pc:sldMkLst>
         <pc:spChg chg="mod">
-          <ac:chgData name="Roger Burek-Bors" userId="52318fc02a824a34" providerId="LiveId" clId="{4CBF7E42-5824-4E57-8FFB-C31B2402BDE5}" dt="2021-05-10T20:43:10.782" v="2128" actId="790"/>
+          <ac:chgData name="Roger Burek-Bors" userId="52318fc02a824a34" providerId="LiveId" clId="{4CBF7E42-5824-4E57-8FFB-C31B2402BDE5}" dt="2021-05-13T05:19:32.102" v="2140" actId="20577"/>
           <ac:spMkLst>
             <pc:docMk/>
             <pc:sldMk cId="3314806396" sldId="307"/>
@@ -2274,7 +2274,7 @@
           <a:p>
             <a:fld id="{2BDA1FB4-8E38-4CEB-9ECB-65C04D5EAEF4}" type="datetimeFigureOut">
               <a:rPr lang="en-US" smtClean="0"/>
-              <a:t>5/10/2021</a:t>
+              <a:t>5/13/2021</a:t>
             </a:fld>
             <a:endParaRPr lang="en-US"/>
           </a:p>
@@ -2673,7 +2673,7 @@
           <a:p>
             <a:fld id="{C764DE79-268F-4C1A-8933-263129D2AF90}" type="datetimeFigureOut">
               <a:rPr lang="en-US" dirty="0"/>
-              <a:t>5/10/2021</a:t>
+              <a:t>5/13/2021</a:t>
             </a:fld>
             <a:endParaRPr lang="en-US"/>
           </a:p>
@@ -2843,7 +2843,7 @@
           <a:p>
             <a:fld id="{C764DE79-268F-4C1A-8933-263129D2AF90}" type="datetimeFigureOut">
               <a:rPr lang="en-US" dirty="0"/>
-              <a:t>5/10/2021</a:t>
+              <a:t>5/13/2021</a:t>
             </a:fld>
             <a:endParaRPr lang="en-US"/>
           </a:p>
@@ -3023,7 +3023,7 @@
           <a:p>
             <a:fld id="{C764DE79-268F-4C1A-8933-263129D2AF90}" type="datetimeFigureOut">
               <a:rPr lang="en-US" dirty="0"/>
-              <a:t>5/10/2021</a:t>
+              <a:t>5/13/2021</a:t>
             </a:fld>
             <a:endParaRPr lang="en-US"/>
           </a:p>
@@ -3193,7 +3193,7 @@
           <a:p>
             <a:fld id="{C764DE79-268F-4C1A-8933-263129D2AF90}" type="datetimeFigureOut">
               <a:rPr lang="en-US" dirty="0"/>
-              <a:t>5/10/2021</a:t>
+              <a:t>5/13/2021</a:t>
             </a:fld>
             <a:endParaRPr lang="en-US"/>
           </a:p>
@@ -3439,7 +3439,7 @@
           <a:p>
             <a:fld id="{C764DE79-268F-4C1A-8933-263129D2AF90}" type="datetimeFigureOut">
               <a:rPr lang="en-US" dirty="0"/>
-              <a:t>5/10/2021</a:t>
+              <a:t>5/13/2021</a:t>
             </a:fld>
             <a:endParaRPr lang="en-US"/>
           </a:p>
@@ -3671,7 +3671,7 @@
           <a:p>
             <a:fld id="{C764DE79-268F-4C1A-8933-263129D2AF90}" type="datetimeFigureOut">
               <a:rPr lang="en-US" dirty="0"/>
-              <a:t>5/10/2021</a:t>
+              <a:t>5/13/2021</a:t>
             </a:fld>
             <a:endParaRPr lang="en-US"/>
           </a:p>
@@ -4038,7 +4038,7 @@
           <a:p>
             <a:fld id="{C764DE79-268F-4C1A-8933-263129D2AF90}" type="datetimeFigureOut">
               <a:rPr lang="en-US" dirty="0"/>
-              <a:t>5/10/2021</a:t>
+              <a:t>5/13/2021</a:t>
             </a:fld>
             <a:endParaRPr lang="en-US"/>
           </a:p>
@@ -4156,7 +4156,7 @@
           <a:p>
             <a:fld id="{C764DE79-268F-4C1A-8933-263129D2AF90}" type="datetimeFigureOut">
               <a:rPr lang="en-US" dirty="0"/>
-              <a:t>5/10/2021</a:t>
+              <a:t>5/13/2021</a:t>
             </a:fld>
             <a:endParaRPr lang="en-US"/>
           </a:p>
@@ -4251,7 +4251,7 @@
           <a:p>
             <a:fld id="{C764DE79-268F-4C1A-8933-263129D2AF90}" type="datetimeFigureOut">
               <a:rPr lang="en-US" dirty="0"/>
-              <a:t>5/10/2021</a:t>
+              <a:t>5/13/2021</a:t>
             </a:fld>
             <a:endParaRPr lang="en-US"/>
           </a:p>
@@ -4528,7 +4528,7 @@
           <a:p>
             <a:fld id="{C764DE79-268F-4C1A-8933-263129D2AF90}" type="datetimeFigureOut">
               <a:rPr lang="en-US" dirty="0"/>
-              <a:t>5/10/2021</a:t>
+              <a:t>5/13/2021</a:t>
             </a:fld>
             <a:endParaRPr lang="en-US"/>
           </a:p>
@@ -4785,7 +4785,7 @@
           <a:p>
             <a:fld id="{C764DE79-268F-4C1A-8933-263129D2AF90}" type="datetimeFigureOut">
               <a:rPr lang="en-US" dirty="0"/>
-              <a:t>5/10/2021</a:t>
+              <a:t>5/13/2021</a:t>
             </a:fld>
             <a:endParaRPr lang="en-US"/>
           </a:p>
@@ -4998,7 +4998,7 @@
           <a:p>
             <a:fld id="{C764DE79-268F-4C1A-8933-263129D2AF90}" type="datetimeFigureOut">
               <a:rPr lang="en-US" dirty="0"/>
-              <a:t>5/10/2021</a:t>
+              <a:t>5/13/2021</a:t>
             </a:fld>
             <a:endParaRPr lang="en-US"/>
           </a:p>
@@ -5547,7 +5547,7 @@
             </a:r>
             <a:r>
               <a:rPr lang="pl-PL" sz="2800" dirty="0"/>
-              <a:t>11</a:t>
+              <a:t>15</a:t>
             </a:r>
             <a:r>
               <a:rPr lang="en-US" sz="2800" dirty="0"/>
@@ -7101,18 +7101,10 @@
               <a:buNone/>
             </a:pPr>
             <a:r>
-              <a:rPr lang="pl-PL" sz="2300" dirty="0">
-                <a:highlight>
-                  <a:srgbClr val="FFFF00"/>
-                </a:highlight>
-              </a:rPr>
-              <a:t>Link to Heroku</a:t>
-            </a:r>
-            <a:endParaRPr lang="en-US" sz="1900" dirty="0">
-              <a:highlight>
-                <a:srgbClr val="FFFF00"/>
-              </a:highlight>
-            </a:endParaRPr>
+              <a:rPr lang="pl-PL" sz="2300" dirty="0"/>
+              <a:t>https://healthcare-project-plroksaegy.herokuapp.com/</a:t>
+            </a:r>
+            <a:endParaRPr lang="en-US" sz="1900" dirty="0"/>
           </a:p>
         </p:txBody>
       </p:sp>
@@ -7949,11 +7941,7 @@
               <a:buAutoNum type="arabicPeriod"/>
             </a:pPr>
             <a:r>
-              <a:rPr lang="en-US" dirty="0">
-                <a:highlight>
-                  <a:srgbClr val="FFFF00"/>
-                </a:highlight>
-              </a:rPr>
+              <a:rPr lang="en-US" dirty="0"/>
               <a:t>Training should be provided to the organization on how to use the ML model.</a:t>
             </a:r>
           </a:p>
@@ -7963,11 +7951,7 @@
               <a:buAutoNum type="arabicPeriod"/>
             </a:pPr>
             <a:r>
-              <a:rPr lang="en-US" dirty="0">
-                <a:highlight>
-                  <a:srgbClr val="FFFF00"/>
-                </a:highlight>
-              </a:rPr>
+              <a:rPr lang="en-US" dirty="0"/>
               <a:t>Each submittal of data on webapp should contribute to expansion of data set.</a:t>
             </a:r>
           </a:p>
@@ -7977,48 +7961,20 @@
               <a:buAutoNum type="arabicPeriod"/>
             </a:pPr>
             <a:r>
-              <a:rPr lang="en-US" dirty="0" err="1">
-                <a:highlight>
-                  <a:srgbClr val="FFFF00"/>
-                </a:highlight>
-              </a:rPr>
-              <a:t>Quterly</a:t>
-            </a:r>
-            <a:r>
-              <a:rPr lang="en-US" dirty="0">
-                <a:highlight>
-                  <a:srgbClr val="FFFF00"/>
-                </a:highlight>
-              </a:rPr>
+              <a:rPr lang="en-US" dirty="0"/>
+              <a:t>Qu</a:t>
+            </a:r>
+            <a:r>
+              <a:rPr lang="pl-PL" dirty="0"/>
+              <a:t>ar</a:t>
+            </a:r>
+            <a:r>
+              <a:rPr lang="en-US" dirty="0" err="1"/>
+              <a:t>terly</a:t>
+            </a:r>
+            <a:r>
+              <a:rPr lang="en-US" dirty="0"/>
               <a:t> new model will be trained based on expanded dataset.</a:t>
-            </a:r>
-          </a:p>
-          <a:p>
-            <a:pPr marL="514350" indent="-514350">
-              <a:buFont typeface="+mj-lt"/>
-              <a:buAutoNum type="arabicPeriod"/>
-            </a:pPr>
-            <a:r>
-              <a:rPr lang="en-US" dirty="0">
-                <a:highlight>
-                  <a:srgbClr val="FFFF00"/>
-                </a:highlight>
-              </a:rPr>
-              <a:t>...</a:t>
-            </a:r>
-          </a:p>
-          <a:p>
-            <a:pPr marL="514350" indent="-514350">
-              <a:buFont typeface="+mj-lt"/>
-              <a:buAutoNum type="arabicPeriod"/>
-            </a:pPr>
-            <a:r>
-              <a:rPr lang="en-US" dirty="0">
-                <a:highlight>
-                  <a:srgbClr val="FFFF00"/>
-                </a:highlight>
-              </a:rPr>
-              <a:t>...</a:t>
             </a:r>
           </a:p>
         </p:txBody>

</xml_diff>